<commit_message>
Website link added to powerpoint
</commit_message>
<xml_diff>
--- a/MILESTONE 4/POWERPOINT/Milestone 4 Presentation.pptx
+++ b/MILESTONE 4/POWERPOINT/Milestone 4 Presentation.pptx
@@ -7789,7 +7789,7 @@
             </a:pPr>
             <a:r>
               <a:rPr lang="en" sz="4400"/>
-              <a:t>Team work/responsibilities</a:t>
+              <a:t>Team work/Responsibilities</a:t>
             </a:r>
             <a:endParaRPr/>
           </a:p>
@@ -8264,6 +8264,44 @@
           </a:p>
           <a:p>
             <a:pPr indent="0" lvl="0" marL="0" rtl="0" algn="l">
+              <a:lnSpc>
+                <a:spcPct val="90000"/>
+              </a:lnSpc>
+              <a:spcBef>
+                <a:spcPts val="500"/>
+              </a:spcBef>
+              <a:spcAft>
+                <a:spcPts val="0"/>
+              </a:spcAft>
+              <a:buClr>
+                <a:schemeClr val="dk1"/>
+              </a:buClr>
+              <a:buSzPts val="1100"/>
+              <a:buFont typeface="Arial"/>
+              <a:buNone/>
+            </a:pPr>
+            <a:r>
+              <a:rPr lang="en" sz="2400" u="sng">
+                <a:solidFill>
+                  <a:schemeClr val="hlink"/>
+                </a:solidFill>
+                <a:latin typeface="Economica"/>
+                <a:ea typeface="Economica"/>
+                <a:cs typeface="Economica"/>
+                <a:sym typeface="Economica"/>
+                <a:hlinkClick r:id="rId3"/>
+              </a:rPr>
+              <a:t>http://www2.cs.uregina.ca/~ayonoado/374/main.html</a:t>
+            </a:r>
+            <a:endParaRPr sz="2400">
+              <a:latin typeface="Economica"/>
+              <a:ea typeface="Economica"/>
+              <a:cs typeface="Economica"/>
+              <a:sym typeface="Economica"/>
+            </a:endParaRPr>
+          </a:p>
+          <a:p>
+            <a:pPr indent="0" lvl="0" marL="0" rtl="0" algn="l">
               <a:spcBef>
                 <a:spcPts val="0"/>
               </a:spcBef>
@@ -8291,7 +8329,7 @@
           <p:nvPr/>
         </p:nvPicPr>
         <p:blipFill>
-          <a:blip r:embed="rId3">
+          <a:blip r:embed="rId4">
             <a:alphaModFix/>
           </a:blip>
           <a:stretch>
@@ -8300,8 +8338,8 @@
         </p:blipFill>
         <p:spPr>
           <a:xfrm>
-            <a:off x="3538450" y="1490575"/>
-            <a:ext cx="5062699" cy="2953248"/>
+            <a:off x="3720000" y="811383"/>
+            <a:ext cx="5062699" cy="2953241"/>
           </a:xfrm>
           <a:prstGeom prst="rect">
             <a:avLst/>
@@ -8371,7 +8409,7 @@
             </a:pPr>
             <a:r>
               <a:rPr lang="en" sz="4400"/>
-              <a:t>Feelings, future MVPs &amp; GitHub</a:t>
+              <a:t>Feelings, Future MVPs &amp; GitHub</a:t>
             </a:r>
             <a:endParaRPr/>
           </a:p>
@@ -8780,7 +8818,7 @@
             </a:pPr>
             <a:r>
               <a:rPr lang="en" sz="4400"/>
-              <a:t>Group reflection</a:t>
+              <a:t>Group Reflection</a:t>
             </a:r>
             <a:endParaRPr/>
           </a:p>

</xml_diff>